<commit_message>
Reorder slides, additional notes and material link
</commit_message>
<xml_diff>
--- a/welcome/welcome.pptx
+++ b/welcome/welcome.pptx
@@ -10,9 +10,9 @@
   </p:notesMasterIdLst>
   <p:sldIdLst>
     <p:sldId id="256" r:id="rId3"/>
-    <p:sldId id="260" r:id="rId4"/>
-    <p:sldId id="261" r:id="rId5"/>
-    <p:sldId id="262" r:id="rId6"/>
+    <p:sldId id="262" r:id="rId4"/>
+    <p:sldId id="260" r:id="rId5"/>
+    <p:sldId id="261" r:id="rId6"/>
     <p:sldId id="263" r:id="rId7"/>
   </p:sldIdLst>
   <p:sldSz cx="9144000" cy="6858000" type="screen4x3"/>
@@ -921,14 +921,8 @@
             </a:pPr>
             <a:r>
               <a:rPr lang="en-US" dirty="0"/>
-              <a:t>Goal is to bring everyone up to speed with the basics of using Git for version control</a:t>
+              <a:t>Keen to help you get up to speed quickly, hence the short notice for the training</a:t>
             </a:r>
-          </a:p>
-          <a:p>
-            <a:pPr marL="158750" indent="0">
-              <a:buNone/>
-            </a:pPr>
-            <a:endParaRPr lang="en-US" dirty="0"/>
           </a:p>
           <a:p>
             <a:pPr marL="158750" indent="0">
@@ -936,14 +930,8 @@
             </a:pPr>
             <a:r>
               <a:rPr lang="en-US" dirty="0"/>
-              <a:t>Which helps provide a foundation for collaborating around code</a:t>
+              <a:t>It’s the first time we’ve delivered this course online, and it contains new material</a:t>
             </a:r>
-          </a:p>
-          <a:p>
-            <a:pPr marL="158750" indent="0">
-              <a:buNone/>
-            </a:pPr>
-            <a:endParaRPr lang="en-US" dirty="0"/>
           </a:p>
           <a:p>
             <a:pPr marL="158750" indent="0">
@@ -951,7 +939,7 @@
             </a:pPr>
             <a:r>
               <a:rPr lang="en-US" dirty="0"/>
-              <a:t>After a brief introduction to version control, we’ll be looking at</a:t>
+              <a:t>Material might be a bit rough around the edges!</a:t>
             </a:r>
           </a:p>
           <a:p>
@@ -960,7 +948,7 @@
             </a:pPr>
             <a:r>
               <a:rPr lang="en-US" dirty="0"/>
-              <a:t> - Creating Git repositories to host your code</a:t>
+              <a:t>You may already know some of the material already</a:t>
             </a:r>
           </a:p>
           <a:p>
@@ -969,8 +957,14 @@
             </a:pPr>
             <a:r>
               <a:rPr lang="en-US" dirty="0"/>
-              <a:t> - And using them as a means to capture the history of development as code evolves</a:t>
+              <a:t>So please bear with us!</a:t>
             </a:r>
+          </a:p>
+          <a:p>
+            <a:pPr marL="158750" indent="0">
+              <a:buNone/>
+            </a:pPr>
+            <a:endParaRPr lang="en-US" dirty="0"/>
           </a:p>
           <a:p>
             <a:pPr marL="158750" indent="0">
@@ -978,7 +972,7 @@
             </a:pPr>
             <a:r>
               <a:rPr lang="en-US" dirty="0"/>
-              <a:t> - We’ll also be making use of GitHub to host code repositories</a:t>
+              <a:t>Also… we appreciate the difficulties of doing such training when working from home,</a:t>
             </a:r>
           </a:p>
           <a:p>
@@ -987,7 +981,7 @@
             </a:pPr>
             <a:r>
               <a:rPr lang="en-US" dirty="0"/>
-              <a:t> - And also exploring use of branches, as a means to support simultaneous lines of development,</a:t>
+              <a:t>particularly in the current circumstances, and that there may be a need to deal</a:t>
             </a:r>
           </a:p>
           <a:p>
@@ -996,40 +990,7 @@
             </a:pPr>
             <a:r>
               <a:rPr lang="en-US" dirty="0"/>
-              <a:t>and established practices for using them</a:t>
-            </a:r>
-          </a:p>
-          <a:p>
-            <a:pPr marL="158750" indent="0">
-              <a:buNone/>
-            </a:pPr>
-            <a:r>
-              <a:rPr lang="en-US" dirty="0"/>
-              <a:t> - We’ll also look at how we can submit our code changes on separate branches</a:t>
-            </a:r>
-          </a:p>
-          <a:p>
-            <a:pPr marL="158750" indent="0">
-              <a:buNone/>
-            </a:pPr>
-            <a:endParaRPr lang="en-US" dirty="0"/>
-          </a:p>
-          <a:p>
-            <a:pPr marL="158750" indent="0">
-              <a:buNone/>
-            </a:pPr>
-            <a:r>
-              <a:rPr lang="en-US" dirty="0"/>
-              <a:t>As well as being a key skill in any developer’s repertoire, it’s a necessary step to doing exciting things in the future like continuous integration,</a:t>
-            </a:r>
-          </a:p>
-          <a:p>
-            <a:pPr marL="158750" indent="0">
-              <a:buNone/>
-            </a:pPr>
-            <a:r>
-              <a:rPr lang="en-US" dirty="0"/>
-              <a:t>Where together with automated testing, you can use a continuous integration infrastructure to automatically build and test your code</a:t>
+              <a:t>with any situations that may arise!</a:t>
             </a:r>
           </a:p>
           <a:p>
@@ -1043,7 +1004,7 @@
     </p:spTree>
     <p:extLst>
       <p:ext uri="{BB962C8B-B14F-4D97-AF65-F5344CB8AC3E}">
-        <p14:creationId xmlns:p14="http://schemas.microsoft.com/office/powerpoint/2010/main" val="2917827074"/>
+        <p14:creationId xmlns:p14="http://schemas.microsoft.com/office/powerpoint/2010/main" val="831299099"/>
       </p:ext>
     </p:extLst>
   </p:cSld>
@@ -1107,8 +1068,14 @@
             </a:pPr>
             <a:r>
               <a:rPr lang="en-US" dirty="0"/>
-              <a:t>Lots of breaks</a:t>
+              <a:t>Goal is to bring everyone up to speed with the basics of using Git for version control</a:t>
             </a:r>
+          </a:p>
+          <a:p>
+            <a:pPr marL="158750" indent="0">
+              <a:buNone/>
+            </a:pPr>
+            <a:endParaRPr lang="en-US" dirty="0"/>
           </a:p>
           <a:p>
             <a:pPr marL="158750" indent="0">
@@ -1116,8 +1083,14 @@
             </a:pPr>
             <a:r>
               <a:rPr lang="en-US" dirty="0"/>
-              <a:t>We delivered the Institute’s Collaboration Workshop online for the first time last month</a:t>
+              <a:t>Which helps provide a foundation for collaborating around code</a:t>
             </a:r>
+          </a:p>
+          <a:p>
+            <a:pPr marL="158750" indent="0">
+              <a:buNone/>
+            </a:pPr>
+            <a:endParaRPr lang="en-US" dirty="0"/>
           </a:p>
           <a:p>
             <a:pPr marL="158750" indent="0">
@@ -1125,7 +1098,7 @@
             </a:pPr>
             <a:r>
               <a:rPr lang="en-US" dirty="0"/>
-              <a:t>When delivering things online, it’s easy to tire quickly!</a:t>
+              <a:t>After a brief introduction to version control, we’ll be looking at</a:t>
             </a:r>
           </a:p>
           <a:p>
@@ -1134,14 +1107,8 @@
             </a:pPr>
             <a:r>
               <a:rPr lang="en-US" dirty="0"/>
-              <a:t>So separated learning into 40 minute sections, hopefully easier to digest</a:t>
+              <a:t> - Creating Git repositories to host your code</a:t>
             </a:r>
-          </a:p>
-          <a:p>
-            <a:pPr marL="158750" indent="0">
-              <a:buNone/>
-            </a:pPr>
-            <a:endParaRPr lang="en-US" dirty="0"/>
           </a:p>
           <a:p>
             <a:pPr marL="158750" indent="0">
@@ -1149,15 +1116,105 @@
             </a:pPr>
             <a:r>
               <a:rPr lang="en-US" dirty="0"/>
-              <a:t>Timings may change a bit, depending on how we get on. We’ll see!</a:t>
+              <a:t> - And using them as a means to capture the history of development as code evolves</a:t>
             </a:r>
+          </a:p>
+          <a:p>
+            <a:pPr marL="158750" indent="0">
+              <a:buNone/>
+            </a:pPr>
+            <a:r>
+              <a:rPr lang="en-US" dirty="0"/>
+              <a:t> - We’ll also be making use of GitHub to host code repositories</a:t>
+            </a:r>
+          </a:p>
+          <a:p>
+            <a:pPr marL="158750" indent="0">
+              <a:buNone/>
+            </a:pPr>
+            <a:r>
+              <a:rPr lang="en-US" dirty="0"/>
+              <a:t> - And also exploring use of branches, as a means to support simultaneous lines of development,</a:t>
+            </a:r>
+          </a:p>
+          <a:p>
+            <a:pPr marL="158750" indent="0">
+              <a:buNone/>
+            </a:pPr>
+            <a:r>
+              <a:rPr lang="en-US" dirty="0"/>
+              <a:t>and established practices for using them</a:t>
+            </a:r>
+          </a:p>
+          <a:p>
+            <a:pPr marL="158750" indent="0">
+              <a:buNone/>
+            </a:pPr>
+            <a:r>
+              <a:rPr lang="en-US" dirty="0"/>
+              <a:t> - We’ll also look at how we can submit our code changes on separate branches</a:t>
+            </a:r>
+          </a:p>
+          <a:p>
+            <a:pPr marL="158750" indent="0">
+              <a:buNone/>
+            </a:pPr>
+            <a:endParaRPr lang="en-US" dirty="0"/>
+          </a:p>
+          <a:p>
+            <a:pPr marL="158750" indent="0">
+              <a:buNone/>
+            </a:pPr>
+            <a:r>
+              <a:rPr lang="en-US" dirty="0"/>
+              <a:t>As well as being a key skill in any developer’s repertoire, it’s a necessary step to doing exciting things in the future like continuous integration,</a:t>
+            </a:r>
+          </a:p>
+          <a:p>
+            <a:pPr marL="158750" indent="0">
+              <a:buNone/>
+            </a:pPr>
+            <a:r>
+              <a:rPr lang="en-US" dirty="0"/>
+              <a:t>Where together with automated testing, you can use a continuous integration infrastructure to automatically build and test your code</a:t>
+            </a:r>
+          </a:p>
+          <a:p>
+            <a:pPr marL="158750" indent="0">
+              <a:buNone/>
+            </a:pPr>
+            <a:endParaRPr lang="en-US" dirty="0"/>
+          </a:p>
+          <a:p>
+            <a:pPr marL="158750" indent="0">
+              <a:buNone/>
+            </a:pPr>
+            <a:r>
+              <a:rPr lang="en-US" dirty="0"/>
+              <a:t>Here’s a link to the material we’ll be using – we’ll refer to it occasionally through the course, and you can use it to refresh your knowledge afterwards</a:t>
+            </a:r>
+          </a:p>
+          <a:p>
+            <a:pPr marL="158750" indent="0">
+              <a:buNone/>
+            </a:pPr>
+            <a:r>
+              <a:rPr lang="en-US" dirty="0"/>
+              <a:t>Try not to be tempted to skip ahead, since we’ve previously observed issues arising when this happens</a:t>
+            </a:r>
+          </a:p>
+          <a:p>
+            <a:pPr marL="158750" indent="0">
+              <a:buNone/>
+            </a:pPr>
+            <a:endParaRPr lang="en-US" dirty="0"/>
           </a:p>
         </p:txBody>
       </p:sp>
     </p:spTree>
     <p:extLst>
       <p:ext uri="{BB962C8B-B14F-4D97-AF65-F5344CB8AC3E}">
-        <p14:creationId xmlns:p14="http://schemas.microsoft.com/office/powerpoint/2010/main" val="3499636925"/>
+        <p14:creationId xmlns:p14="http://schemas.microsoft.com/office/powerpoint/2010/main" val="2917827074"/>
       </p:ext>
     </p:extLst>
   </p:cSld>
@@ -1221,13 +1278,8 @@
             </a:pPr>
             <a:r>
               <a:rPr lang="en-US" dirty="0"/>
-              <a:t>Keen to help you get up to speed quickly, hence the short notice for </a:t>
+              <a:t>Lots of breaks</a:t>
             </a:r>
-            <a:r>
-              <a:rPr lang="en-US"/>
-              <a:t>the training</a:t>
-            </a:r>
-            <a:endParaRPr lang="en-US" dirty="0"/>
           </a:p>
           <a:p>
             <a:pPr marL="158750" indent="0">
@@ -1235,14 +1287,8 @@
             </a:pPr>
             <a:r>
               <a:rPr lang="en-US" dirty="0"/>
-              <a:t>Material might be a bit rough around the edges!</a:t>
+              <a:t>We delivered the Institute’s Collaboration Workshop online for the first time last month</a:t>
             </a:r>
-          </a:p>
-          <a:p>
-            <a:pPr marL="158750" indent="0">
-              <a:buNone/>
-            </a:pPr>
-            <a:endParaRPr lang="en-US" dirty="0"/>
           </a:p>
           <a:p>
             <a:pPr marL="158750" indent="0">
@@ -1250,7 +1296,7 @@
             </a:pPr>
             <a:r>
               <a:rPr lang="en-US" dirty="0"/>
-              <a:t>Also… we appreciate the difficulties of doing such training when working from home,</a:t>
+              <a:t>When delivering things online, it’s easy to tire quickly!</a:t>
             </a:r>
           </a:p>
           <a:p>
@@ -1259,8 +1305,14 @@
             </a:pPr>
             <a:r>
               <a:rPr lang="en-US" dirty="0"/>
-              <a:t>particularly in the current circumstances, and that there may be a need to deal</a:t>
+              <a:t>So separated learning into 40 minute sections, hopefully easier to digest</a:t>
             </a:r>
+          </a:p>
+          <a:p>
+            <a:pPr marL="158750" indent="0">
+              <a:buNone/>
+            </a:pPr>
+            <a:endParaRPr lang="en-US" dirty="0"/>
           </a:p>
           <a:p>
             <a:pPr marL="158750" indent="0">
@@ -1268,21 +1320,15 @@
             </a:pPr>
             <a:r>
               <a:rPr lang="en-US" dirty="0"/>
-              <a:t>with any situations that may arise!</a:t>
+              <a:t>Timings may change a bit, depending on how we get on. We’ll see how we go!</a:t>
             </a:r>
-          </a:p>
-          <a:p>
-            <a:pPr marL="158750" indent="0">
-              <a:buNone/>
-            </a:pPr>
-            <a:endParaRPr lang="en-US" dirty="0"/>
           </a:p>
         </p:txBody>
       </p:sp>
     </p:spTree>
     <p:extLst>
       <p:ext uri="{BB962C8B-B14F-4D97-AF65-F5344CB8AC3E}">
-        <p14:creationId xmlns:p14="http://schemas.microsoft.com/office/powerpoint/2010/main" val="831299099"/>
+        <p14:creationId xmlns:p14="http://schemas.microsoft.com/office/powerpoint/2010/main" val="3499636925"/>
       </p:ext>
     </p:extLst>
   </p:cSld>
@@ -1353,7 +1399,13 @@
             </a:r>
           </a:p>
           <a:p>
-            <a:endParaRPr lang="en-US" dirty="0"/>
+            <a:pPr marL="158750" lvl="0" indent="0">
+              <a:spcBef>
+                <a:spcPts val="0"/>
+              </a:spcBef>
+              <a:buNone/>
+            </a:pPr>
+            <a:endParaRPr lang="en-US" sz="2400" dirty="0"/>
           </a:p>
         </p:txBody>
       </p:sp>
@@ -11829,6 +11881,145 @@
           <p:cNvPr id="2" name="Title 1">
             <a:extLst>
               <a:ext uri="{FF2B5EF4-FFF2-40B4-BE49-F238E27FC236}">
+                <a16:creationId xmlns:a16="http://schemas.microsoft.com/office/drawing/2014/main" id="{A58E88BC-0E64-CC4A-B0F7-B3E957383404}"/>
+              </a:ext>
+            </a:extLst>
+          </p:cNvPr>
+          <p:cNvSpPr>
+            <a:spLocks noGrp="1"/>
+          </p:cNvSpPr>
+          <p:nvPr>
+            <p:ph type="title"/>
+          </p:nvPr>
+        </p:nvSpPr>
+        <p:spPr/>
+        <p:txBody>
+          <a:bodyPr/>
+          <a:lstStyle/>
+          <a:p>
+            <a:r>
+              <a:rPr lang="en-US" dirty="0"/>
+              <a:t>How today will work</a:t>
+            </a:r>
+          </a:p>
+        </p:txBody>
+      </p:sp>
+      <p:sp>
+        <p:nvSpPr>
+          <p:cNvPr id="3" name="Text Placeholder 2">
+            <a:extLst>
+              <a:ext uri="{FF2B5EF4-FFF2-40B4-BE49-F238E27FC236}">
+                <a16:creationId xmlns:a16="http://schemas.microsoft.com/office/drawing/2014/main" id="{32CA79B6-4F0B-044C-9640-51FCD2B60C08}"/>
+              </a:ext>
+            </a:extLst>
+          </p:cNvPr>
+          <p:cNvSpPr>
+            <a:spLocks noGrp="1"/>
+          </p:cNvSpPr>
+          <p:nvPr>
+            <p:ph type="body" idx="1"/>
+          </p:nvPr>
+        </p:nvSpPr>
+        <p:spPr>
+          <a:xfrm>
+            <a:off x="311700" y="1536633"/>
+            <a:ext cx="8520600" cy="5108866"/>
+          </a:xfrm>
+        </p:spPr>
+        <p:txBody>
+          <a:bodyPr/>
+          <a:lstStyle/>
+          <a:p>
+            <a:r>
+              <a:rPr lang="en-US" sz="2800" dirty="0"/>
+              <a:t>Keen to help get you up to speed quickly</a:t>
+            </a:r>
+          </a:p>
+          <a:p>
+            <a:pPr lvl="1">
+              <a:spcBef>
+                <a:spcPts val="0"/>
+              </a:spcBef>
+            </a:pPr>
+            <a:r>
+              <a:rPr lang="en-US" sz="2400" dirty="0"/>
+              <a:t>Pilot of online delivery and new material</a:t>
+            </a:r>
+          </a:p>
+          <a:p>
+            <a:pPr lvl="1">
+              <a:spcBef>
+                <a:spcPts val="0"/>
+              </a:spcBef>
+            </a:pPr>
+            <a:r>
+              <a:rPr lang="en-US" sz="2400" dirty="0"/>
+              <a:t>Please bear with us!</a:t>
+            </a:r>
+          </a:p>
+          <a:p>
+            <a:pPr lvl="1">
+              <a:spcBef>
+                <a:spcPts val="0"/>
+              </a:spcBef>
+            </a:pPr>
+            <a:r>
+              <a:rPr lang="en-US" sz="2400" dirty="0"/>
+              <a:t>May cover material you know already (especially at the start)</a:t>
+            </a:r>
+          </a:p>
+          <a:p>
+            <a:endParaRPr lang="en-US" sz="2800" dirty="0"/>
+          </a:p>
+          <a:p>
+            <a:r>
+              <a:rPr lang="en-US" sz="2800" dirty="0"/>
+              <a:t>Practical - live coding, exercises</a:t>
+            </a:r>
+          </a:p>
+          <a:p>
+            <a:r>
+              <a:rPr lang="en-US" sz="2800" dirty="0"/>
+              <a:t>Code examples use Python, but don’t need to know it</a:t>
+            </a:r>
+          </a:p>
+        </p:txBody>
+      </p:sp>
+    </p:spTree>
+    <p:extLst>
+      <p:ext uri="{BB962C8B-B14F-4D97-AF65-F5344CB8AC3E}">
+        <p14:creationId xmlns:p14="http://schemas.microsoft.com/office/powerpoint/2010/main" val="3627010450"/>
+      </p:ext>
+    </p:extLst>
+  </p:cSld>
+  <p:clrMapOvr>
+    <a:masterClrMapping/>
+  </p:clrMapOvr>
+</p:sld>
+</file>
+
+<file path=ppt/slides/slide3.xml><?xml version="1.0" encoding="utf-8"?>
+<p:sld xmlns:a="http://schemas.openxmlformats.org/drawingml/2006/main" xmlns:r="http://schemas.openxmlformats.org/officeDocument/2006/relationships" xmlns:p="http://schemas.openxmlformats.org/presentationml/2006/main">
+  <p:cSld>
+    <p:spTree>
+      <p:nvGrpSpPr>
+        <p:cNvPr id="1" name=""/>
+        <p:cNvGrpSpPr/>
+        <p:nvPr/>
+      </p:nvGrpSpPr>
+      <p:grpSpPr>
+        <a:xfrm>
+          <a:off x="0" y="0"/>
+          <a:ext cx="0" cy="0"/>
+          <a:chOff x="0" y="0"/>
+          <a:chExt cx="0" cy="0"/>
+        </a:xfrm>
+      </p:grpSpPr>
+      <p:sp>
+        <p:nvSpPr>
+          <p:cNvPr id="2" name="Title 1">
+            <a:extLst>
+              <a:ext uri="{FF2B5EF4-FFF2-40B4-BE49-F238E27FC236}">
                 <a16:creationId xmlns:a16="http://schemas.microsoft.com/office/drawing/2014/main" id="{CDF2AC2D-D1A3-9348-95E7-FFCD357DF139}"/>
               </a:ext>
             </a:extLst>
@@ -11953,6 +12144,330 @@
           </a:p>
         </p:txBody>
       </p:sp>
+      <p:sp>
+        <p:nvSpPr>
+          <p:cNvPr id="4" name="Google Shape;124;p27">
+            <a:extLst>
+              <a:ext uri="{FF2B5EF4-FFF2-40B4-BE49-F238E27FC236}">
+                <a16:creationId xmlns:a16="http://schemas.microsoft.com/office/drawing/2014/main" id="{42DE04FB-0C7D-7141-A247-465C6363AF70}"/>
+              </a:ext>
+            </a:extLst>
+          </p:cNvPr>
+          <p:cNvSpPr txBox="1">
+            <a:spLocks/>
+          </p:cNvSpPr>
+          <p:nvPr/>
+        </p:nvSpPr>
+        <p:spPr>
+          <a:xfrm>
+            <a:off x="0" y="5608067"/>
+            <a:ext cx="9144000" cy="616269"/>
+          </a:xfrm>
+          <a:prstGeom prst="rect">
+            <a:avLst/>
+          </a:prstGeom>
+          <a:solidFill>
+            <a:srgbClr val="D9EAD3"/>
+          </a:solidFill>
+          <a:ln>
+            <a:noFill/>
+          </a:ln>
+        </p:spPr>
+        <p:txBody>
+          <a:bodyPr spcFirstLastPara="1" wrap="square" lIns="91425" tIns="91425" rIns="91425" bIns="91425" anchor="ctr" anchorCtr="0">
+            <a:noAutofit/>
+          </a:bodyPr>
+          <a:lstStyle>
+            <a:defPPr marR="0" lvl="0" algn="l" rtl="0">
+              <a:lnSpc>
+                <a:spcPct val="100000"/>
+              </a:lnSpc>
+              <a:spcBef>
+                <a:spcPts val="0"/>
+              </a:spcBef>
+              <a:spcAft>
+                <a:spcPts val="0"/>
+              </a:spcAft>
+            </a:defPPr>
+            <a:lvl1pPr marL="457200" marR="0" lvl="0" indent="-342900" algn="l" rtl="0">
+              <a:lnSpc>
+                <a:spcPct val="115000"/>
+              </a:lnSpc>
+              <a:spcBef>
+                <a:spcPts val="0"/>
+              </a:spcBef>
+              <a:spcAft>
+                <a:spcPts val="0"/>
+              </a:spcAft>
+              <a:buClr>
+                <a:schemeClr val="dk2"/>
+              </a:buClr>
+              <a:buSzPts val="1800"/>
+              <a:buFont typeface="Arial"/>
+              <a:buChar char="●"/>
+              <a:defRPr sz="1800" b="0" i="0" u="none" strike="noStrike" cap="none">
+                <a:solidFill>
+                  <a:schemeClr val="dk2"/>
+                </a:solidFill>
+                <a:latin typeface="Arial"/>
+                <a:ea typeface="Arial"/>
+                <a:cs typeface="Arial"/>
+                <a:sym typeface="Arial"/>
+              </a:defRPr>
+            </a:lvl1pPr>
+            <a:lvl2pPr marL="914400" marR="0" lvl="1" indent="-317500" algn="l" rtl="0">
+              <a:lnSpc>
+                <a:spcPct val="115000"/>
+              </a:lnSpc>
+              <a:spcBef>
+                <a:spcPts val="1600"/>
+              </a:spcBef>
+              <a:spcAft>
+                <a:spcPts val="0"/>
+              </a:spcAft>
+              <a:buClr>
+                <a:schemeClr val="dk2"/>
+              </a:buClr>
+              <a:buSzPts val="1400"/>
+              <a:buFont typeface="Arial"/>
+              <a:buChar char="○"/>
+              <a:defRPr sz="1400" b="0" i="0" u="none" strike="noStrike" cap="none">
+                <a:solidFill>
+                  <a:schemeClr val="dk2"/>
+                </a:solidFill>
+                <a:latin typeface="Arial"/>
+                <a:ea typeface="Arial"/>
+                <a:cs typeface="Arial"/>
+                <a:sym typeface="Arial"/>
+              </a:defRPr>
+            </a:lvl2pPr>
+            <a:lvl3pPr marL="1371600" marR="0" lvl="2" indent="-317500" algn="l" rtl="0">
+              <a:lnSpc>
+                <a:spcPct val="115000"/>
+              </a:lnSpc>
+              <a:spcBef>
+                <a:spcPts val="1600"/>
+              </a:spcBef>
+              <a:spcAft>
+                <a:spcPts val="0"/>
+              </a:spcAft>
+              <a:buClr>
+                <a:schemeClr val="dk2"/>
+              </a:buClr>
+              <a:buSzPts val="1400"/>
+              <a:buFont typeface="Arial"/>
+              <a:buChar char="■"/>
+              <a:defRPr sz="1400" b="0" i="0" u="none" strike="noStrike" cap="none">
+                <a:solidFill>
+                  <a:schemeClr val="dk2"/>
+                </a:solidFill>
+                <a:latin typeface="Arial"/>
+                <a:ea typeface="Arial"/>
+                <a:cs typeface="Arial"/>
+                <a:sym typeface="Arial"/>
+              </a:defRPr>
+            </a:lvl3pPr>
+            <a:lvl4pPr marL="1828800" marR="0" lvl="3" indent="-317500" algn="l" rtl="0">
+              <a:lnSpc>
+                <a:spcPct val="115000"/>
+              </a:lnSpc>
+              <a:spcBef>
+                <a:spcPts val="1600"/>
+              </a:spcBef>
+              <a:spcAft>
+                <a:spcPts val="0"/>
+              </a:spcAft>
+              <a:buClr>
+                <a:schemeClr val="dk2"/>
+              </a:buClr>
+              <a:buSzPts val="1400"/>
+              <a:buFont typeface="Arial"/>
+              <a:buChar char="●"/>
+              <a:defRPr sz="1400" b="0" i="0" u="none" strike="noStrike" cap="none">
+                <a:solidFill>
+                  <a:schemeClr val="dk2"/>
+                </a:solidFill>
+                <a:latin typeface="Arial"/>
+                <a:ea typeface="Arial"/>
+                <a:cs typeface="Arial"/>
+                <a:sym typeface="Arial"/>
+              </a:defRPr>
+            </a:lvl4pPr>
+            <a:lvl5pPr marL="2286000" marR="0" lvl="4" indent="-317500" algn="l" rtl="0">
+              <a:lnSpc>
+                <a:spcPct val="115000"/>
+              </a:lnSpc>
+              <a:spcBef>
+                <a:spcPts val="1600"/>
+              </a:spcBef>
+              <a:spcAft>
+                <a:spcPts val="0"/>
+              </a:spcAft>
+              <a:buClr>
+                <a:schemeClr val="dk2"/>
+              </a:buClr>
+              <a:buSzPts val="1400"/>
+              <a:buFont typeface="Arial"/>
+              <a:buChar char="○"/>
+              <a:defRPr sz="1400" b="0" i="0" u="none" strike="noStrike" cap="none">
+                <a:solidFill>
+                  <a:schemeClr val="dk2"/>
+                </a:solidFill>
+                <a:latin typeface="Arial"/>
+                <a:ea typeface="Arial"/>
+                <a:cs typeface="Arial"/>
+                <a:sym typeface="Arial"/>
+              </a:defRPr>
+            </a:lvl5pPr>
+            <a:lvl6pPr marL="2743200" marR="0" lvl="5" indent="-317500" algn="l" rtl="0">
+              <a:lnSpc>
+                <a:spcPct val="115000"/>
+              </a:lnSpc>
+              <a:spcBef>
+                <a:spcPts val="1600"/>
+              </a:spcBef>
+              <a:spcAft>
+                <a:spcPts val="0"/>
+              </a:spcAft>
+              <a:buClr>
+                <a:schemeClr val="dk2"/>
+              </a:buClr>
+              <a:buSzPts val="1400"/>
+              <a:buFont typeface="Arial"/>
+              <a:buChar char="■"/>
+              <a:defRPr sz="1400" b="0" i="0" u="none" strike="noStrike" cap="none">
+                <a:solidFill>
+                  <a:schemeClr val="dk2"/>
+                </a:solidFill>
+                <a:latin typeface="Arial"/>
+                <a:ea typeface="Arial"/>
+                <a:cs typeface="Arial"/>
+                <a:sym typeface="Arial"/>
+              </a:defRPr>
+            </a:lvl6pPr>
+            <a:lvl7pPr marL="3200400" marR="0" lvl="6" indent="-317500" algn="l" rtl="0">
+              <a:lnSpc>
+                <a:spcPct val="115000"/>
+              </a:lnSpc>
+              <a:spcBef>
+                <a:spcPts val="1600"/>
+              </a:spcBef>
+              <a:spcAft>
+                <a:spcPts val="0"/>
+              </a:spcAft>
+              <a:buClr>
+                <a:schemeClr val="dk2"/>
+              </a:buClr>
+              <a:buSzPts val="1400"/>
+              <a:buFont typeface="Arial"/>
+              <a:buChar char="●"/>
+              <a:defRPr sz="1400" b="0" i="0" u="none" strike="noStrike" cap="none">
+                <a:solidFill>
+                  <a:schemeClr val="dk2"/>
+                </a:solidFill>
+                <a:latin typeface="Arial"/>
+                <a:ea typeface="Arial"/>
+                <a:cs typeface="Arial"/>
+                <a:sym typeface="Arial"/>
+              </a:defRPr>
+            </a:lvl7pPr>
+            <a:lvl8pPr marL="3657600" marR="0" lvl="7" indent="-317500" algn="l" rtl="0">
+              <a:lnSpc>
+                <a:spcPct val="115000"/>
+              </a:lnSpc>
+              <a:spcBef>
+                <a:spcPts val="1600"/>
+              </a:spcBef>
+              <a:spcAft>
+                <a:spcPts val="0"/>
+              </a:spcAft>
+              <a:buClr>
+                <a:schemeClr val="dk2"/>
+              </a:buClr>
+              <a:buSzPts val="1400"/>
+              <a:buFont typeface="Arial"/>
+              <a:buChar char="○"/>
+              <a:defRPr sz="1400" b="0" i="0" u="none" strike="noStrike" cap="none">
+                <a:solidFill>
+                  <a:schemeClr val="dk2"/>
+                </a:solidFill>
+                <a:latin typeface="Arial"/>
+                <a:ea typeface="Arial"/>
+                <a:cs typeface="Arial"/>
+                <a:sym typeface="Arial"/>
+              </a:defRPr>
+            </a:lvl8pPr>
+            <a:lvl9pPr marL="4114800" marR="0" lvl="8" indent="-317500" algn="l" rtl="0">
+              <a:lnSpc>
+                <a:spcPct val="115000"/>
+              </a:lnSpc>
+              <a:spcBef>
+                <a:spcPts val="1600"/>
+              </a:spcBef>
+              <a:spcAft>
+                <a:spcPts val="1600"/>
+              </a:spcAft>
+              <a:buClr>
+                <a:schemeClr val="dk2"/>
+              </a:buClr>
+              <a:buSzPts val="1400"/>
+              <a:buFont typeface="Arial"/>
+              <a:buChar char="■"/>
+              <a:defRPr sz="1400" b="0" i="0" u="none" strike="noStrike" cap="none">
+                <a:solidFill>
+                  <a:schemeClr val="dk2"/>
+                </a:solidFill>
+                <a:latin typeface="Arial"/>
+                <a:ea typeface="Arial"/>
+                <a:cs typeface="Arial"/>
+                <a:sym typeface="Arial"/>
+              </a:defRPr>
+            </a:lvl9pPr>
+          </a:lstStyle>
+          <a:p>
+            <a:pPr marL="158750" indent="0" algn="ctr">
+              <a:buNone/>
+            </a:pPr>
+            <a:r>
+              <a:rPr lang="en-US" sz="2400" b="1" dirty="0">
+                <a:solidFill>
+                  <a:schemeClr val="tx1"/>
+                </a:solidFill>
+              </a:rPr>
+              <a:t>https://</a:t>
+            </a:r>
+            <a:r>
+              <a:rPr lang="en-US" sz="2400" b="1" dirty="0" err="1">
+                <a:solidFill>
+                  <a:schemeClr val="tx1"/>
+                </a:solidFill>
+              </a:rPr>
+              <a:t>bit.ly</a:t>
+            </a:r>
+            <a:r>
+              <a:rPr lang="en-US" sz="2400" b="1" dirty="0">
+                <a:solidFill>
+                  <a:schemeClr val="tx1"/>
+                </a:solidFill>
+              </a:rPr>
+              <a:t>/</a:t>
+            </a:r>
+            <a:r>
+              <a:rPr lang="en-US" sz="2400" b="1" dirty="0" err="1">
+                <a:solidFill>
+                  <a:schemeClr val="tx1"/>
+                </a:solidFill>
+              </a:rPr>
+              <a:t>RAMPGit</a:t>
+            </a:r>
+            <a:endParaRPr lang="en-US" sz="2400" b="1" dirty="0">
+              <a:solidFill>
+                <a:schemeClr val="tx1"/>
+              </a:solidFill>
+            </a:endParaRPr>
+          </a:p>
+        </p:txBody>
+      </p:sp>
     </p:spTree>
     <p:extLst>
       <p:ext uri="{BB962C8B-B14F-4D97-AF65-F5344CB8AC3E}">
@@ -11966,7 +12481,7 @@
 </p:sld>
 </file>
 
-<file path=ppt/slides/slide3.xml><?xml version="1.0" encoding="utf-8"?>
+<file path=ppt/slides/slide4.xml><?xml version="1.0" encoding="utf-8"?>
 <p:sld xmlns:a="http://schemas.openxmlformats.org/drawingml/2006/main" xmlns:r="http://schemas.openxmlformats.org/officeDocument/2006/relationships" xmlns:p="http://schemas.openxmlformats.org/presentationml/2006/main">
   <p:cSld>
     <p:spTree>
@@ -12488,145 +13003,6 @@
     <p:extLst>
       <p:ext uri="{BB962C8B-B14F-4D97-AF65-F5344CB8AC3E}">
         <p14:creationId xmlns:p14="http://schemas.microsoft.com/office/powerpoint/2010/main" val="2251070094"/>
-      </p:ext>
-    </p:extLst>
-  </p:cSld>
-  <p:clrMapOvr>
-    <a:masterClrMapping/>
-  </p:clrMapOvr>
-</p:sld>
-</file>
-
-<file path=ppt/slides/slide4.xml><?xml version="1.0" encoding="utf-8"?>
-<p:sld xmlns:a="http://schemas.openxmlformats.org/drawingml/2006/main" xmlns:r="http://schemas.openxmlformats.org/officeDocument/2006/relationships" xmlns:p="http://schemas.openxmlformats.org/presentationml/2006/main">
-  <p:cSld>
-    <p:spTree>
-      <p:nvGrpSpPr>
-        <p:cNvPr id="1" name=""/>
-        <p:cNvGrpSpPr/>
-        <p:nvPr/>
-      </p:nvGrpSpPr>
-      <p:grpSpPr>
-        <a:xfrm>
-          <a:off x="0" y="0"/>
-          <a:ext cx="0" cy="0"/>
-          <a:chOff x="0" y="0"/>
-          <a:chExt cx="0" cy="0"/>
-        </a:xfrm>
-      </p:grpSpPr>
-      <p:sp>
-        <p:nvSpPr>
-          <p:cNvPr id="2" name="Title 1">
-            <a:extLst>
-              <a:ext uri="{FF2B5EF4-FFF2-40B4-BE49-F238E27FC236}">
-                <a16:creationId xmlns:a16="http://schemas.microsoft.com/office/drawing/2014/main" id="{A58E88BC-0E64-CC4A-B0F7-B3E957383404}"/>
-              </a:ext>
-            </a:extLst>
-          </p:cNvPr>
-          <p:cNvSpPr>
-            <a:spLocks noGrp="1"/>
-          </p:cNvSpPr>
-          <p:nvPr>
-            <p:ph type="title"/>
-          </p:nvPr>
-        </p:nvSpPr>
-        <p:spPr/>
-        <p:txBody>
-          <a:bodyPr/>
-          <a:lstStyle/>
-          <a:p>
-            <a:r>
-              <a:rPr lang="en-US" dirty="0"/>
-              <a:t>How today will work</a:t>
-            </a:r>
-          </a:p>
-        </p:txBody>
-      </p:sp>
-      <p:sp>
-        <p:nvSpPr>
-          <p:cNvPr id="3" name="Text Placeholder 2">
-            <a:extLst>
-              <a:ext uri="{FF2B5EF4-FFF2-40B4-BE49-F238E27FC236}">
-                <a16:creationId xmlns:a16="http://schemas.microsoft.com/office/drawing/2014/main" id="{32CA79B6-4F0B-044C-9640-51FCD2B60C08}"/>
-              </a:ext>
-            </a:extLst>
-          </p:cNvPr>
-          <p:cNvSpPr>
-            <a:spLocks noGrp="1"/>
-          </p:cNvSpPr>
-          <p:nvPr>
-            <p:ph type="body" idx="1"/>
-          </p:nvPr>
-        </p:nvSpPr>
-        <p:spPr>
-          <a:xfrm>
-            <a:off x="311700" y="1536633"/>
-            <a:ext cx="8520600" cy="5108866"/>
-          </a:xfrm>
-        </p:spPr>
-        <p:txBody>
-          <a:bodyPr/>
-          <a:lstStyle/>
-          <a:p>
-            <a:r>
-              <a:rPr lang="en-US" sz="2800" dirty="0"/>
-              <a:t>Pilot of online delivery and new material</a:t>
-            </a:r>
-          </a:p>
-          <a:p>
-            <a:pPr lvl="1">
-              <a:spcBef>
-                <a:spcPts val="0"/>
-              </a:spcBef>
-            </a:pPr>
-            <a:r>
-              <a:rPr lang="en-US" sz="2400" dirty="0"/>
-              <a:t>Keen to help get you up to speed quickly</a:t>
-            </a:r>
-          </a:p>
-          <a:p>
-            <a:pPr lvl="1">
-              <a:spcBef>
-                <a:spcPts val="0"/>
-              </a:spcBef>
-            </a:pPr>
-            <a:r>
-              <a:rPr lang="en-US" sz="2400" dirty="0"/>
-              <a:t>Please bear with us!</a:t>
-            </a:r>
-          </a:p>
-          <a:p>
-            <a:pPr lvl="1">
-              <a:spcBef>
-                <a:spcPts val="0"/>
-              </a:spcBef>
-            </a:pPr>
-            <a:r>
-              <a:rPr lang="en-US" sz="2400" dirty="0"/>
-              <a:t>May cover material you know already (especially at the start)</a:t>
-            </a:r>
-          </a:p>
-          <a:p>
-            <a:endParaRPr lang="en-US" sz="2800" dirty="0"/>
-          </a:p>
-          <a:p>
-            <a:r>
-              <a:rPr lang="en-US" sz="2800" dirty="0"/>
-              <a:t>Practical - live coding, exercises</a:t>
-            </a:r>
-          </a:p>
-          <a:p>
-            <a:r>
-              <a:rPr lang="en-US" sz="2800" dirty="0"/>
-              <a:t>Code examples use Python, but don’t need to know it</a:t>
-            </a:r>
-          </a:p>
-        </p:txBody>
-      </p:sp>
-    </p:spTree>
-    <p:extLst>
-      <p:ext uri="{BB962C8B-B14F-4D97-AF65-F5344CB8AC3E}">
-        <p14:creationId xmlns:p14="http://schemas.microsoft.com/office/powerpoint/2010/main" val="3627010450"/>
       </p:ext>
     </p:extLst>
   </p:cSld>
@@ -12743,7 +13119,7 @@
           <a:p>
             <a:r>
               <a:rPr lang="en-US" sz="2800" dirty="0"/>
-              <a:t>Ask questions – vocally or via Zoom chat</a:t>
+              <a:t>Please ask questions – vocally or via Zoom chat</a:t>
             </a:r>
           </a:p>
         </p:txBody>

</xml_diff>